<commit_message>
New files for video 4 Odometry and GoToGoal behavior.
</commit_message>
<xml_diff>
--- a/doc/Mark 01 - Slides.pptx
+++ b/doc/Mark 01 - Slides.pptx
@@ -245,7 +245,7 @@
           <a:p>
             <a:fld id="{D5166F21-6648-4399-B2DE-50F342DE59FB}" type="datetimeFigureOut">
               <a:rPr lang="en-US" smtClean="0"/>
-              <a:t>10/2/2020</a:t>
+              <a:t>10/22/2020</a:t>
             </a:fld>
             <a:endParaRPr lang="en-US"/>
           </a:p>
@@ -415,7 +415,7 @@
           <a:p>
             <a:fld id="{D5166F21-6648-4399-B2DE-50F342DE59FB}" type="datetimeFigureOut">
               <a:rPr lang="en-US" smtClean="0"/>
-              <a:t>10/2/2020</a:t>
+              <a:t>10/22/2020</a:t>
             </a:fld>
             <a:endParaRPr lang="en-US"/>
           </a:p>
@@ -595,7 +595,7 @@
           <a:p>
             <a:fld id="{D5166F21-6648-4399-B2DE-50F342DE59FB}" type="datetimeFigureOut">
               <a:rPr lang="en-US" smtClean="0"/>
-              <a:t>10/2/2020</a:t>
+              <a:t>10/22/2020</a:t>
             </a:fld>
             <a:endParaRPr lang="en-US"/>
           </a:p>
@@ -765,7 +765,7 @@
           <a:p>
             <a:fld id="{D5166F21-6648-4399-B2DE-50F342DE59FB}" type="datetimeFigureOut">
               <a:rPr lang="en-US" smtClean="0"/>
-              <a:t>10/2/2020</a:t>
+              <a:t>10/22/2020</a:t>
             </a:fld>
             <a:endParaRPr lang="en-US"/>
           </a:p>
@@ -1011,7 +1011,7 @@
           <a:p>
             <a:fld id="{D5166F21-6648-4399-B2DE-50F342DE59FB}" type="datetimeFigureOut">
               <a:rPr lang="en-US" smtClean="0"/>
-              <a:t>10/2/2020</a:t>
+              <a:t>10/22/2020</a:t>
             </a:fld>
             <a:endParaRPr lang="en-US"/>
           </a:p>
@@ -1243,7 +1243,7 @@
           <a:p>
             <a:fld id="{D5166F21-6648-4399-B2DE-50F342DE59FB}" type="datetimeFigureOut">
               <a:rPr lang="en-US" smtClean="0"/>
-              <a:t>10/2/2020</a:t>
+              <a:t>10/22/2020</a:t>
             </a:fld>
             <a:endParaRPr lang="en-US"/>
           </a:p>
@@ -1610,7 +1610,7 @@
           <a:p>
             <a:fld id="{D5166F21-6648-4399-B2DE-50F342DE59FB}" type="datetimeFigureOut">
               <a:rPr lang="en-US" smtClean="0"/>
-              <a:t>10/2/2020</a:t>
+              <a:t>10/22/2020</a:t>
             </a:fld>
             <a:endParaRPr lang="en-US"/>
           </a:p>
@@ -1728,7 +1728,7 @@
           <a:p>
             <a:fld id="{D5166F21-6648-4399-B2DE-50F342DE59FB}" type="datetimeFigureOut">
               <a:rPr lang="en-US" smtClean="0"/>
-              <a:t>10/2/2020</a:t>
+              <a:t>10/22/2020</a:t>
             </a:fld>
             <a:endParaRPr lang="en-US"/>
           </a:p>
@@ -1823,7 +1823,7 @@
           <a:p>
             <a:fld id="{D5166F21-6648-4399-B2DE-50F342DE59FB}" type="datetimeFigureOut">
               <a:rPr lang="en-US" smtClean="0"/>
-              <a:t>10/2/2020</a:t>
+              <a:t>10/22/2020</a:t>
             </a:fld>
             <a:endParaRPr lang="en-US"/>
           </a:p>
@@ -2100,7 +2100,7 @@
           <a:p>
             <a:fld id="{D5166F21-6648-4399-B2DE-50F342DE59FB}" type="datetimeFigureOut">
               <a:rPr lang="en-US" smtClean="0"/>
-              <a:t>10/2/2020</a:t>
+              <a:t>10/22/2020</a:t>
             </a:fld>
             <a:endParaRPr lang="en-US"/>
           </a:p>
@@ -2357,7 +2357,7 @@
           <a:p>
             <a:fld id="{D5166F21-6648-4399-B2DE-50F342DE59FB}" type="datetimeFigureOut">
               <a:rPr lang="en-US" smtClean="0"/>
-              <a:t>10/2/2020</a:t>
+              <a:t>10/22/2020</a:t>
             </a:fld>
             <a:endParaRPr lang="en-US"/>
           </a:p>
@@ -2570,7 +2570,7 @@
           <a:p>
             <a:fld id="{D5166F21-6648-4399-B2DE-50F342DE59FB}" type="datetimeFigureOut">
               <a:rPr lang="en-US" smtClean="0"/>
-              <a:t>10/2/2020</a:t>
+              <a:t>10/22/2020</a:t>
             </a:fld>
             <a:endParaRPr lang="en-US"/>
           </a:p>
@@ -6081,8 +6081,13 @@
           <a:p>
             <a:r>
               <a:rPr lang="en-US" dirty="0"/>
-              <a:t>Our wheel encoder has 40 ticks per resolution</a:t>
+              <a:t>Our wheel encoder has 40 ticks </a:t>
             </a:r>
+            <a:r>
+              <a:rPr lang="en-US"/>
+              <a:t>per revolution</a:t>
+            </a:r>
+            <a:endParaRPr lang="en-US" dirty="0"/>
           </a:p>
         </p:txBody>
       </p:sp>
@@ -6311,8 +6316,8 @@
           </a:p>
         </p:txBody>
       </p:sp>
-      <mc:AlternateContent xmlns:mc="http://schemas.openxmlformats.org/markup-compatibility/2006">
-        <mc:Choice xmlns:a14="http://schemas.microsoft.com/office/drawing/2010/main" Requires="a14">
+      <mc:AlternateContent xmlns:mc="http://schemas.openxmlformats.org/markup-compatibility/2006" xmlns:a14="http://schemas.microsoft.com/office/drawing/2010/main">
+        <mc:Choice Requires="a14">
           <p:sp>
             <p:nvSpPr>
               <p:cNvPr id="20" name="CaixaDeTexto 19">
@@ -6461,7 +6466,7 @@
             </p:txBody>
           </p:sp>
         </mc:Choice>
-        <mc:Fallback>
+        <mc:Fallback xmlns="">
           <p:sp>
             <p:nvSpPr>
               <p:cNvPr id="20" name="CaixaDeTexto 19">
@@ -6534,7 +6539,6 @@
           </a:bodyPr>
           <a:lstStyle/>
           <a:p>
-            <a:pPr/>
             <a:endParaRPr lang="en-US" b="0" dirty="0"/>
           </a:p>
           <a:p>
@@ -7302,8 +7306,8 @@
           </a:p>
         </p:txBody>
       </p:sp>
-      <mc:AlternateContent xmlns:mc="http://schemas.openxmlformats.org/markup-compatibility/2006">
-        <mc:Choice xmlns:a14="http://schemas.microsoft.com/office/drawing/2010/main" Requires="a14">
+      <mc:AlternateContent xmlns:mc="http://schemas.openxmlformats.org/markup-compatibility/2006" xmlns:a14="http://schemas.microsoft.com/office/drawing/2010/main">
+        <mc:Choice Requires="a14">
           <p:sp>
             <p:nvSpPr>
               <p:cNvPr id="51" name="CaixaDeTexto 50">
@@ -7332,6 +7336,7 @@
               </a:bodyPr>
               <a:lstStyle/>
               <a:p>
+                <a:pPr/>
                 <a14:m>
                   <m:oMathPara xmlns:m="http://schemas.openxmlformats.org/officeDocument/2006/math">
                     <m:oMathParaPr>
@@ -7353,7 +7358,7 @@
             </p:txBody>
           </p:sp>
         </mc:Choice>
-        <mc:Fallback>
+        <mc:Fallback xmlns="">
           <p:sp>
             <p:nvSpPr>
               <p:cNvPr id="51" name="CaixaDeTexto 50">
@@ -7398,8 +7403,8 @@
           </p:sp>
         </mc:Fallback>
       </mc:AlternateContent>
-      <mc:AlternateContent xmlns:mc="http://schemas.openxmlformats.org/markup-compatibility/2006">
-        <mc:Choice xmlns:a14="http://schemas.microsoft.com/office/drawing/2010/main" Requires="a14">
+      <mc:AlternateContent xmlns:mc="http://schemas.openxmlformats.org/markup-compatibility/2006" xmlns:a14="http://schemas.microsoft.com/office/drawing/2010/main">
+        <mc:Choice Requires="a14">
           <p:sp>
             <p:nvSpPr>
               <p:cNvPr id="55" name="CaixaDeTexto 54">
@@ -7471,7 +7476,7 @@
             </p:txBody>
           </p:sp>
         </mc:Choice>
-        <mc:Fallback>
+        <mc:Fallback xmlns="">
           <p:sp>
             <p:nvSpPr>
               <p:cNvPr id="55" name="CaixaDeTexto 54">
@@ -7516,8 +7521,8 @@
           </p:sp>
         </mc:Fallback>
       </mc:AlternateContent>
-      <mc:AlternateContent xmlns:mc="http://schemas.openxmlformats.org/markup-compatibility/2006">
-        <mc:Choice xmlns:a14="http://schemas.microsoft.com/office/drawing/2010/main" Requires="a14">
+      <mc:AlternateContent xmlns:mc="http://schemas.openxmlformats.org/markup-compatibility/2006" xmlns:a14="http://schemas.microsoft.com/office/drawing/2010/main">
+        <mc:Choice Requires="a14">
           <p:sp>
             <p:nvSpPr>
               <p:cNvPr id="57" name="CaixaDeTexto 56">
@@ -7589,7 +7594,7 @@
             </p:txBody>
           </p:sp>
         </mc:Choice>
-        <mc:Fallback>
+        <mc:Fallback xmlns="">
           <p:sp>
             <p:nvSpPr>
               <p:cNvPr id="57" name="CaixaDeTexto 56">
@@ -7680,8 +7685,8 @@
           </a:p>
         </p:txBody>
       </p:sp>
-      <mc:AlternateContent xmlns:mc="http://schemas.openxmlformats.org/markup-compatibility/2006">
-        <mc:Choice xmlns:a14="http://schemas.microsoft.com/office/drawing/2010/main" Requires="a14">
+      <mc:AlternateContent xmlns:mc="http://schemas.openxmlformats.org/markup-compatibility/2006" xmlns:a14="http://schemas.microsoft.com/office/drawing/2010/main">
+        <mc:Choice Requires="a14">
           <p:sp>
             <p:nvSpPr>
               <p:cNvPr id="61" name="CaixaDeTexto 60">
@@ -7710,7 +7715,6 @@
               </a:bodyPr>
               <a:lstStyle/>
               <a:p>
-                <a:pPr/>
                 <a14:m>
                   <m:oMath xmlns:m="http://schemas.openxmlformats.org/officeDocument/2006/math">
                     <m:sSub>
@@ -7865,7 +7869,7 @@
             </p:txBody>
           </p:sp>
         </mc:Choice>
-        <mc:Fallback>
+        <mc:Fallback xmlns="">
           <p:sp>
             <p:nvSpPr>
               <p:cNvPr id="61" name="CaixaDeTexto 60">
@@ -7910,8 +7914,8 @@
           </p:sp>
         </mc:Fallback>
       </mc:AlternateContent>
-      <mc:AlternateContent xmlns:mc="http://schemas.openxmlformats.org/markup-compatibility/2006">
-        <mc:Choice xmlns:a14="http://schemas.microsoft.com/office/drawing/2010/main" Requires="a14">
+      <mc:AlternateContent xmlns:mc="http://schemas.openxmlformats.org/markup-compatibility/2006" xmlns:a14="http://schemas.microsoft.com/office/drawing/2010/main">
+        <mc:Choice Requires="a14">
           <p:sp>
             <p:nvSpPr>
               <p:cNvPr id="63" name="CaixaDeTexto 62">
@@ -8084,7 +8088,7 @@
             </p:txBody>
           </p:sp>
         </mc:Choice>
-        <mc:Fallback>
+        <mc:Fallback xmlns="">
           <p:sp>
             <p:nvSpPr>
               <p:cNvPr id="63" name="CaixaDeTexto 62">

</xml_diff>